<commit_message>
fixed some more pictures/slides
</commit_message>
<xml_diff>
--- a/doc/diagrams/UiComponent.pptx
+++ b/doc/diagrams/UiComponent.pptx
@@ -208,7 +208,7 @@
           <a:p>
             <a:fld id="{DC50A2AC-D691-437C-A69B-81ECFE08AD4B}" type="datetimeFigureOut">
               <a:rPr lang="en-SG" smtClean="0"/>
-              <a:t>30/3/2016</a:t>
+              <a:t>9/4/2016</a:t>
             </a:fld>
             <a:endParaRPr lang="en-SG"/>
           </a:p>
@@ -761,7 +761,7 @@
             <a:fld id="{1D8BD707-D9CF-40AE-B4C6-C98DA3205C09}" type="datetimeFigureOut">
               <a:rPr lang="en-US" smtClean="0"/>
               <a:pPr/>
-              <a:t>3/30/2016</a:t>
+              <a:t>4/9/2016</a:t>
             </a:fld>
             <a:endParaRPr lang="en-US"/>
           </a:p>
@@ -968,7 +968,7 @@
             <a:fld id="{1D8BD707-D9CF-40AE-B4C6-C98DA3205C09}" type="datetimeFigureOut">
               <a:rPr lang="en-US" smtClean="0"/>
               <a:pPr/>
-              <a:t>3/30/2016</a:t>
+              <a:t>4/9/2016</a:t>
             </a:fld>
             <a:endParaRPr lang="en-US"/>
           </a:p>
@@ -1175,7 +1175,7 @@
             <a:fld id="{1D8BD707-D9CF-40AE-B4C6-C98DA3205C09}" type="datetimeFigureOut">
               <a:rPr lang="en-US" smtClean="0"/>
               <a:pPr/>
-              <a:t>3/30/2016</a:t>
+              <a:t>4/9/2016</a:t>
             </a:fld>
             <a:endParaRPr lang="en-US"/>
           </a:p>
@@ -1382,7 +1382,7 @@
             <a:fld id="{1D8BD707-D9CF-40AE-B4C6-C98DA3205C09}" type="datetimeFigureOut">
               <a:rPr lang="en-US" smtClean="0"/>
               <a:pPr/>
-              <a:t>3/30/2016</a:t>
+              <a:t>4/9/2016</a:t>
             </a:fld>
             <a:endParaRPr lang="en-US"/>
           </a:p>
@@ -1655,7 +1655,7 @@
             <a:fld id="{1D8BD707-D9CF-40AE-B4C6-C98DA3205C09}" type="datetimeFigureOut">
               <a:rPr lang="en-US" smtClean="0"/>
               <a:pPr/>
-              <a:t>3/30/2016</a:t>
+              <a:t>4/9/2016</a:t>
             </a:fld>
             <a:endParaRPr lang="en-US"/>
           </a:p>
@@ -1978,7 +1978,7 @@
             <a:fld id="{1D8BD707-D9CF-40AE-B4C6-C98DA3205C09}" type="datetimeFigureOut">
               <a:rPr lang="en-US" smtClean="0"/>
               <a:pPr/>
-              <a:t>3/30/2016</a:t>
+              <a:t>4/9/2016</a:t>
             </a:fld>
             <a:endParaRPr lang="en-US"/>
           </a:p>
@@ -2441,7 +2441,7 @@
             <a:fld id="{1D8BD707-D9CF-40AE-B4C6-C98DA3205C09}" type="datetimeFigureOut">
               <a:rPr lang="en-US" smtClean="0"/>
               <a:pPr/>
-              <a:t>3/30/2016</a:t>
+              <a:t>4/9/2016</a:t>
             </a:fld>
             <a:endParaRPr lang="en-US"/>
           </a:p>
@@ -2588,7 +2588,7 @@
             <a:fld id="{1D8BD707-D9CF-40AE-B4C6-C98DA3205C09}" type="datetimeFigureOut">
               <a:rPr lang="en-US" smtClean="0"/>
               <a:pPr/>
-              <a:t>3/30/2016</a:t>
+              <a:t>4/9/2016</a:t>
             </a:fld>
             <a:endParaRPr lang="en-US"/>
           </a:p>
@@ -2704,7 +2704,7 @@
             <a:fld id="{1D8BD707-D9CF-40AE-B4C6-C98DA3205C09}" type="datetimeFigureOut">
               <a:rPr lang="en-US" smtClean="0"/>
               <a:pPr/>
-              <a:t>3/30/2016</a:t>
+              <a:t>4/9/2016</a:t>
             </a:fld>
             <a:endParaRPr lang="en-US"/>
           </a:p>
@@ -3011,7 +3011,7 @@
             <a:fld id="{1D8BD707-D9CF-40AE-B4C6-C98DA3205C09}" type="datetimeFigureOut">
               <a:rPr lang="en-US" smtClean="0"/>
               <a:pPr/>
-              <a:t>3/30/2016</a:t>
+              <a:t>4/9/2016</a:t>
             </a:fld>
             <a:endParaRPr lang="en-US"/>
           </a:p>
@@ -3294,7 +3294,7 @@
             <a:fld id="{1D8BD707-D9CF-40AE-B4C6-C98DA3205C09}" type="datetimeFigureOut">
               <a:rPr lang="en-US" smtClean="0"/>
               <a:pPr/>
-              <a:t>3/30/2016</a:t>
+              <a:t>4/9/2016</a:t>
             </a:fld>
             <a:endParaRPr lang="en-US"/>
           </a:p>
@@ -5519,7 +5519,11 @@
             <a:pPr algn="ctr"/>
             <a:r>
               <a:rPr lang="en-US" sz="1600" b="1" dirty="0" smtClean="0"/>
-              <a:t>*Action</a:t>
+              <a:t>_</a:t>
+            </a:r>
+            <a:r>
+              <a:rPr lang="en-US" sz="1600" b="1" dirty="0" err="1" smtClean="0"/>
+              <a:t>abc_Action</a:t>
             </a:r>
             <a:endParaRPr lang="en-SG" sz="1600" b="1" dirty="0"/>
           </a:p>
@@ -5610,7 +5614,7 @@
           <a:p>
             <a:pPr algn="ctr"/>
             <a:r>
-              <a:rPr lang="en-US" sz="1600" b="1" dirty="0"/>
+              <a:rPr lang="en-US" sz="1600" b="1" dirty="0" smtClean="0"/>
               <a:t>*</a:t>
             </a:r>
             <a:r>
@@ -5674,14 +5678,14 @@
       </p:sp>
       <p:sp>
         <p:nvSpPr>
-          <p:cNvPr id="423" name="Rectangle 422"/>
+          <p:cNvPr id="422" name="Rectangle 421"/>
           <p:cNvSpPr/>
           <p:nvPr/>
         </p:nvSpPr>
         <p:spPr>
           <a:xfrm>
-            <a:off x="6261043" y="1515269"/>
-            <a:ext cx="1398903" cy="377438"/>
+            <a:off x="1549462" y="716420"/>
+            <a:ext cx="1727498" cy="377438"/>
           </a:xfrm>
           <a:prstGeom prst="rect">
             <a:avLst/>
@@ -5709,8 +5713,8 @@
           <a:p>
             <a:pPr algn="ctr"/>
             <a:r>
-              <a:rPr lang="en-US" sz="1600" b="1" dirty="0" smtClean="0"/>
-              <a:t>*Servlet</a:t>
+              <a:rPr lang="en-US" sz="1600" b="1" dirty="0" err="1" smtClean="0"/>
+              <a:t>ControllerServlet</a:t>
             </a:r>
             <a:endParaRPr lang="en-SG" sz="1600" b="1" dirty="0"/>
           </a:p>
@@ -5718,13 +5722,13 @@
       </p:sp>
       <p:sp>
         <p:nvSpPr>
-          <p:cNvPr id="424" name="Rectangle 423"/>
+          <p:cNvPr id="423" name="Rectangle 422"/>
           <p:cNvSpPr/>
           <p:nvPr/>
         </p:nvSpPr>
         <p:spPr>
           <a:xfrm>
-            <a:off x="6337243" y="1442631"/>
+            <a:off x="5569077" y="1276717"/>
             <a:ext cx="1398903" cy="377438"/>
           </a:xfrm>
           <a:prstGeom prst="rect">
@@ -5762,13 +5766,57 @@
       </p:sp>
       <p:sp>
         <p:nvSpPr>
+          <p:cNvPr id="424" name="Rectangle 423"/>
+          <p:cNvSpPr/>
+          <p:nvPr/>
+        </p:nvSpPr>
+        <p:spPr>
+          <a:xfrm>
+            <a:off x="5645277" y="1348409"/>
+            <a:ext cx="1398903" cy="377438"/>
+          </a:xfrm>
+          <a:prstGeom prst="rect">
+            <a:avLst/>
+          </a:prstGeom>
+        </p:spPr>
+        <p:style>
+          <a:lnRef idx="2">
+            <a:schemeClr val="accent1">
+              <a:shade val="50000"/>
+            </a:schemeClr>
+          </a:lnRef>
+          <a:fillRef idx="1">
+            <a:schemeClr val="accent1"/>
+          </a:fillRef>
+          <a:effectRef idx="0">
+            <a:schemeClr val="accent1"/>
+          </a:effectRef>
+          <a:fontRef idx="minor">
+            <a:schemeClr val="lt1"/>
+          </a:fontRef>
+        </p:style>
+        <p:txBody>
+          <a:bodyPr rtlCol="0" anchor="ctr"/>
+          <a:lstStyle/>
+          <a:p>
+            <a:pPr algn="ctr"/>
+            <a:r>
+              <a:rPr lang="en-US" sz="1600" b="1" dirty="0" smtClean="0"/>
+              <a:t>*Servlet</a:t>
+            </a:r>
+            <a:endParaRPr lang="en-SG" sz="1600" b="1" dirty="0"/>
+          </a:p>
+        </p:txBody>
+      </p:sp>
+      <p:sp>
+        <p:nvSpPr>
           <p:cNvPr id="425" name="Rectangle 424"/>
           <p:cNvSpPr/>
           <p:nvPr/>
         </p:nvSpPr>
         <p:spPr>
           <a:xfrm>
-            <a:off x="6460809" y="1362869"/>
+            <a:off x="5768843" y="1442631"/>
             <a:ext cx="1398903" cy="377438"/>
           </a:xfrm>
           <a:prstGeom prst="rect">
@@ -6805,7 +6853,7 @@
         </p:nvSpPr>
         <p:spPr>
           <a:xfrm>
-            <a:off x="3581937" y="905669"/>
+            <a:off x="3581937" y="587364"/>
             <a:ext cx="1066800" cy="307777"/>
           </a:xfrm>
           <a:prstGeom prst="rect">
@@ -7195,7 +7243,7 @@
         </p:nvSpPr>
         <p:spPr>
           <a:xfrm rot="5400000" flipH="1">
-            <a:off x="4566740" y="995566"/>
+            <a:off x="4566740" y="703699"/>
             <a:ext cx="155075" cy="122330"/>
           </a:xfrm>
           <a:prstGeom prst="flowChartExtract">
@@ -7376,125 +7424,6 @@
           </a:fontRef>
         </p:style>
       </p:cxnSp>
-      <p:sp>
-        <p:nvSpPr>
-          <p:cNvPr id="67" name="Isosceles Triangle 66"/>
-          <p:cNvSpPr/>
-          <p:nvPr/>
-        </p:nvSpPr>
-        <p:spPr>
-          <a:xfrm flipV="1">
-            <a:off x="6973887" y="1134269"/>
-            <a:ext cx="276225" cy="228600"/>
-          </a:xfrm>
-          <a:prstGeom prst="triangle">
-            <a:avLst/>
-          </a:prstGeom>
-          <a:ln/>
-        </p:spPr>
-        <p:style>
-          <a:lnRef idx="2">
-            <a:schemeClr val="accent1">
-              <a:shade val="50000"/>
-            </a:schemeClr>
-          </a:lnRef>
-          <a:fillRef idx="1">
-            <a:schemeClr val="accent1"/>
-          </a:fillRef>
-          <a:effectRef idx="0">
-            <a:schemeClr val="accent1"/>
-          </a:effectRef>
-          <a:fontRef idx="minor">
-            <a:schemeClr val="lt1"/>
-          </a:fontRef>
-        </p:style>
-        <p:txBody>
-          <a:bodyPr rtlCol="0" anchor="ctr"/>
-          <a:lstStyle/>
-          <a:p>
-            <a:pPr algn="ctr"/>
-            <a:endParaRPr lang="en-SG"/>
-          </a:p>
-        </p:txBody>
-      </p:sp>
-      <p:cxnSp>
-        <p:nvCxnSpPr>
-          <p:cNvPr id="68" name="Elbow Connector 67"/>
-          <p:cNvCxnSpPr>
-            <a:endCxn id="67" idx="3"/>
-          </p:cNvCxnSpPr>
-          <p:nvPr/>
-        </p:nvCxnSpPr>
-        <p:spPr>
-          <a:xfrm>
-            <a:off x="3171294" y="817634"/>
-            <a:ext cx="3940706" cy="316635"/>
-          </a:xfrm>
-          <a:prstGeom prst="bentConnector2">
-            <a:avLst/>
-          </a:prstGeom>
-          <a:ln/>
-          <a:effectLst/>
-        </p:spPr>
-        <p:style>
-          <a:lnRef idx="2">
-            <a:schemeClr val="accent1"/>
-          </a:lnRef>
-          <a:fillRef idx="0">
-            <a:schemeClr val="accent1"/>
-          </a:fillRef>
-          <a:effectRef idx="1">
-            <a:schemeClr val="accent1"/>
-          </a:effectRef>
-          <a:fontRef idx="minor">
-            <a:schemeClr val="tx1"/>
-          </a:fontRef>
-        </p:style>
-      </p:cxnSp>
-      <p:sp>
-        <p:nvSpPr>
-          <p:cNvPr id="422" name="Rectangle 421"/>
-          <p:cNvSpPr/>
-          <p:nvPr/>
-        </p:nvSpPr>
-        <p:spPr>
-          <a:xfrm>
-            <a:off x="1549462" y="716420"/>
-            <a:ext cx="1727498" cy="377438"/>
-          </a:xfrm>
-          <a:prstGeom prst="rect">
-            <a:avLst/>
-          </a:prstGeom>
-        </p:spPr>
-        <p:style>
-          <a:lnRef idx="2">
-            <a:schemeClr val="accent1">
-              <a:shade val="50000"/>
-            </a:schemeClr>
-          </a:lnRef>
-          <a:fillRef idx="1">
-            <a:schemeClr val="accent1"/>
-          </a:fillRef>
-          <a:effectRef idx="0">
-            <a:schemeClr val="accent1"/>
-          </a:effectRef>
-          <a:fontRef idx="minor">
-            <a:schemeClr val="lt1"/>
-          </a:fontRef>
-        </p:style>
-        <p:txBody>
-          <a:bodyPr rtlCol="0" anchor="ctr"/>
-          <a:lstStyle/>
-          <a:p>
-            <a:pPr algn="ctr"/>
-            <a:r>
-              <a:rPr lang="en-US" sz="1600" b="1" dirty="0" err="1" smtClean="0"/>
-              <a:t>ControllerServlet</a:t>
-            </a:r>
-            <a:endParaRPr lang="en-SG" sz="1600" b="1" dirty="0"/>
-          </a:p>
-        </p:txBody>
-      </p:sp>
     </p:spTree>
     <p:extLst>
       <p:ext uri="{BB962C8B-B14F-4D97-AF65-F5344CB8AC3E}">

</xml_diff>